<commit_message>
Adding final report and readme file
</commit_message>
<xml_diff>
--- a/Impact of Lifestyle and Mental Health on Academics.pptx
+++ b/Impact of Lifestyle and Mental Health on Academics.pptx
@@ -2879,7 +2879,7 @@
           <a:p>
             <a:fld id="{6C5CD247-011D-4679-A0AB-C78239E98A6D}" type="datetimeFigureOut">
               <a:rPr lang="en-IN" smtClean="0"/>
-              <a:t>02-12-2024</a:t>
+              <a:t>06-12-2024</a:t>
             </a:fld>
             <a:endParaRPr lang="en-IN"/>
           </a:p>
@@ -3587,7 +3587,7 @@
           <a:p>
             <a:fld id="{7A7BA62E-B3F0-4659-9707-42F44E60DE25}" type="datetimeFigureOut">
               <a:rPr lang="en-IN" smtClean="0"/>
-              <a:t>02-12-2024</a:t>
+              <a:t>06-12-2024</a:t>
             </a:fld>
             <a:endParaRPr lang="en-IN"/>
           </a:p>
@@ -3925,7 +3925,7 @@
           <a:p>
             <a:fld id="{7A7BA62E-B3F0-4659-9707-42F44E60DE25}" type="datetimeFigureOut">
               <a:rPr lang="en-IN" smtClean="0"/>
-              <a:t>02-12-2024</a:t>
+              <a:t>06-12-2024</a:t>
             </a:fld>
             <a:endParaRPr lang="en-IN"/>
           </a:p>
@@ -4326,7 +4326,7 @@
           <a:p>
             <a:fld id="{7A7BA62E-B3F0-4659-9707-42F44E60DE25}" type="datetimeFigureOut">
               <a:rPr lang="en-IN" smtClean="0"/>
-              <a:t>02-12-2024</a:t>
+              <a:t>06-12-2024</a:t>
             </a:fld>
             <a:endParaRPr lang="en-IN"/>
           </a:p>
@@ -4662,7 +4662,7 @@
           <a:p>
             <a:fld id="{7A7BA62E-B3F0-4659-9707-42F44E60DE25}" type="datetimeFigureOut">
               <a:rPr lang="en-IN" smtClean="0"/>
-              <a:t>02-12-2024</a:t>
+              <a:t>06-12-2024</a:t>
             </a:fld>
             <a:endParaRPr lang="en-IN"/>
           </a:p>
@@ -4982,7 +4982,7 @@
           <a:p>
             <a:fld id="{7A7BA62E-B3F0-4659-9707-42F44E60DE25}" type="datetimeFigureOut">
               <a:rPr lang="en-IN" smtClean="0"/>
-              <a:t>02-12-2024</a:t>
+              <a:t>06-12-2024</a:t>
             </a:fld>
             <a:endParaRPr lang="en-IN"/>
           </a:p>
@@ -5378,7 +5378,7 @@
           <a:p>
             <a:fld id="{7A7BA62E-B3F0-4659-9707-42F44E60DE25}" type="datetimeFigureOut">
               <a:rPr lang="en-IN" smtClean="0"/>
-              <a:t>02-12-2024</a:t>
+              <a:t>06-12-2024</a:t>
             </a:fld>
             <a:endParaRPr lang="en-IN"/>
           </a:p>
@@ -5635,7 +5635,7 @@
           <a:p>
             <a:fld id="{7A7BA62E-B3F0-4659-9707-42F44E60DE25}" type="datetimeFigureOut">
               <a:rPr lang="en-IN" smtClean="0"/>
-              <a:t>02-12-2024</a:t>
+              <a:t>06-12-2024</a:t>
             </a:fld>
             <a:endParaRPr lang="en-IN"/>
           </a:p>
@@ -5897,7 +5897,7 @@
           <a:p>
             <a:fld id="{7A7BA62E-B3F0-4659-9707-42F44E60DE25}" type="datetimeFigureOut">
               <a:rPr lang="en-IN" smtClean="0"/>
-              <a:t>02-12-2024</a:t>
+              <a:t>06-12-2024</a:t>
             </a:fld>
             <a:endParaRPr lang="en-IN"/>
           </a:p>
@@ -6159,7 +6159,7 @@
           <a:p>
             <a:fld id="{7A7BA62E-B3F0-4659-9707-42F44E60DE25}" type="datetimeFigureOut">
               <a:rPr lang="en-IN" smtClean="0"/>
-              <a:t>02-12-2024</a:t>
+              <a:t>06-12-2024</a:t>
             </a:fld>
             <a:endParaRPr lang="en-IN"/>
           </a:p>
@@ -6488,7 +6488,7 @@
           <a:p>
             <a:fld id="{7A7BA62E-B3F0-4659-9707-42F44E60DE25}" type="datetimeFigureOut">
               <a:rPr lang="en-IN" smtClean="0"/>
-              <a:t>02-12-2024</a:t>
+              <a:t>06-12-2024</a:t>
             </a:fld>
             <a:endParaRPr lang="en-IN"/>
           </a:p>
@@ -6811,7 +6811,7 @@
           <a:p>
             <a:fld id="{7A7BA62E-B3F0-4659-9707-42F44E60DE25}" type="datetimeFigureOut">
               <a:rPr lang="en-IN" smtClean="0"/>
-              <a:t>02-12-2024</a:t>
+              <a:t>06-12-2024</a:t>
             </a:fld>
             <a:endParaRPr lang="en-IN"/>
           </a:p>
@@ -7268,7 +7268,7 @@
           <a:p>
             <a:fld id="{7A7BA62E-B3F0-4659-9707-42F44E60DE25}" type="datetimeFigureOut">
               <a:rPr lang="en-IN" smtClean="0"/>
-              <a:t>02-12-2024</a:t>
+              <a:t>06-12-2024</a:t>
             </a:fld>
             <a:endParaRPr lang="en-IN"/>
           </a:p>
@@ -7473,7 +7473,7 @@
           <a:p>
             <a:fld id="{7A7BA62E-B3F0-4659-9707-42F44E60DE25}" type="datetimeFigureOut">
               <a:rPr lang="en-IN" smtClean="0"/>
-              <a:t>02-12-2024</a:t>
+              <a:t>06-12-2024</a:t>
             </a:fld>
             <a:endParaRPr lang="en-IN"/>
           </a:p>
@@ -7650,7 +7650,7 @@
           <a:p>
             <a:fld id="{7A7BA62E-B3F0-4659-9707-42F44E60DE25}" type="datetimeFigureOut">
               <a:rPr lang="en-IN" smtClean="0"/>
-              <a:t>02-12-2024</a:t>
+              <a:t>06-12-2024</a:t>
             </a:fld>
             <a:endParaRPr lang="en-IN"/>
           </a:p>
@@ -7983,7 +7983,7 @@
           <a:p>
             <a:fld id="{7A7BA62E-B3F0-4659-9707-42F44E60DE25}" type="datetimeFigureOut">
               <a:rPr lang="en-IN" smtClean="0"/>
-              <a:t>02-12-2024</a:t>
+              <a:t>06-12-2024</a:t>
             </a:fld>
             <a:endParaRPr lang="en-IN"/>
           </a:p>
@@ -8328,7 +8328,7 @@
           <a:p>
             <a:fld id="{7A7BA62E-B3F0-4659-9707-42F44E60DE25}" type="datetimeFigureOut">
               <a:rPr lang="en-IN" smtClean="0"/>
-              <a:t>02-12-2024</a:t>
+              <a:t>06-12-2024</a:t>
             </a:fld>
             <a:endParaRPr lang="en-IN"/>
           </a:p>
@@ -10445,7 +10445,7 @@
           <a:p>
             <a:fld id="{7A7BA62E-B3F0-4659-9707-42F44E60DE25}" type="datetimeFigureOut">
               <a:rPr lang="en-IN" smtClean="0"/>
-              <a:t>02-12-2024</a:t>
+              <a:t>06-12-2024</a:t>
             </a:fld>
             <a:endParaRPr lang="en-IN"/>
           </a:p>
@@ -11237,7 +11237,7 @@
             </a:pPr>
             <a:r>
               <a:rPr lang="en-US" dirty="0"/>
-              <a:t>Religious and social activities help mitigate future insecurity and isolation.</a:t>
+              <a:t>Engaging and social activities help mitigate future insecurity and isolation.</a:t>
             </a:r>
           </a:p>
           <a:p>
@@ -16026,10 +16026,10 @@
       </p:sp>
       <p:pic>
         <p:nvPicPr>
-          <p:cNvPr id="5" name="Content Placeholder 4" descr="A close-up of a graph&#10;&#10;Description automatically generated">
+          <p:cNvPr id="7" name="Content Placeholder 6">
             <a:extLst>
               <a:ext uri="{FF2B5EF4-FFF2-40B4-BE49-F238E27FC236}">
-                <a16:creationId xmlns:a16="http://schemas.microsoft.com/office/drawing/2014/main" id="{F37E401D-18EF-BB36-B907-06AB3CF20E42}"/>
+                <a16:creationId xmlns:a16="http://schemas.microsoft.com/office/drawing/2014/main" id="{FB27DA6E-47B5-E8CF-BC40-40D8C13761D4}"/>
               </a:ext>
             </a:extLst>
           </p:cNvPr>
@@ -16054,8 +16054,8 @@
         </p:blipFill>
         <p:spPr>
           <a:xfrm>
-            <a:off x="201478" y="1224366"/>
-            <a:ext cx="11990521" cy="5633634"/>
+            <a:off x="180523" y="1376314"/>
+            <a:ext cx="11830953" cy="5362642"/>
           </a:xfrm>
         </p:spPr>
       </p:pic>

</xml_diff>